<commit_message>
adding notes in lecture files;adding book and ex files
</commit_message>
<xml_diff>
--- a/lecture/5-Support_Vector_Machines.pptx
+++ b/lecture/5-Support_Vector_Machines.pptx
@@ -172,6 +172,22 @@
       </a:defRPr>
     </a:lvl9pPr>
   </p:defaultTextStyle>
+  <p:extLst>
+    <p:ext uri="{EFAFB233-063F-42B5-8137-9DF3F51BA10A}">
+      <p15:sldGuideLst xmlns:p15="http://schemas.microsoft.com/office/powerpoint/2012/main">
+        <p15:guide id="1" orient="horz" pos="2160">
+          <p15:clr>
+            <a:srgbClr val="A4A3A4"/>
+          </p15:clr>
+        </p15:guide>
+        <p15:guide id="2" pos="2880">
+          <p15:clr>
+            <a:srgbClr val="A4A3A4"/>
+          </p15:clr>
+        </p15:guide>
+      </p15:sldGuideLst>
+    </p:ext>
+  </p:extLst>
 </p:presentation>
 </file>
 
@@ -4069,7 +4085,7 @@
               <a:pPr>
                 <a:defRPr/>
               </a:pPr>
-              <a:t>2016/7/11</a:t>
+              <a:t>2016/12/9</a:t>
             </a:fld>
             <a:endParaRPr lang="zh-CN" altLang="en-US"/>
           </a:p>
@@ -4423,6 +4439,391 @@
           <a:lstStyle/>
           <a:p>
             <a:r>
+              <a:rPr lang="en-US" altLang="zh-CN" dirty="0" smtClean="0"/>
+              <a:t>W</a:t>
+            </a:r>
+            <a:r>
+              <a:rPr lang="zh-CN" altLang="en-US" dirty="0" smtClean="0"/>
+              <a:t>方向：与超平面垂直</a:t>
+            </a:r>
+            <a:endParaRPr lang="zh-CN" altLang="en-US" dirty="0"/>
+          </a:p>
+        </p:txBody>
+      </p:sp>
+      <p:sp>
+        <p:nvSpPr>
+          <p:cNvPr id="4" name="灯片编号占位符 3"/>
+          <p:cNvSpPr>
+            <a:spLocks noGrp="1"/>
+          </p:cNvSpPr>
+          <p:nvPr>
+            <p:ph type="sldNum" sz="quarter" idx="10"/>
+          </p:nvPr>
+        </p:nvSpPr>
+        <p:spPr/>
+        <p:txBody>
+          <a:bodyPr/>
+          <a:lstStyle/>
+          <a:p>
+            <a:pPr>
+              <a:defRPr/>
+            </a:pPr>
+            <a:fld id="{0486AD57-67ED-4140-9F70-67C055736CF8}" type="slidenum">
+              <a:rPr lang="zh-CN" altLang="en-US" smtClean="0"/>
+              <a:pPr>
+                <a:defRPr/>
+              </a:pPr>
+              <a:t>3</a:t>
+            </a:fld>
+            <a:endParaRPr lang="zh-CN" altLang="en-US"/>
+          </a:p>
+        </p:txBody>
+      </p:sp>
+    </p:spTree>
+    <p:extLst>
+      <p:ext uri="{BB962C8B-B14F-4D97-AF65-F5344CB8AC3E}">
+        <p14:creationId xmlns:p14="http://schemas.microsoft.com/office/powerpoint/2010/main" val="3428307127"/>
+      </p:ext>
+    </p:extLst>
+  </p:cSld>
+  <p:clrMapOvr>
+    <a:masterClrMapping/>
+  </p:clrMapOvr>
+</p:notes>
+</file>
+
+<file path=ppt/notesSlides/notesSlide2.xml><?xml version="1.0" encoding="utf-8"?>
+<p:notes xmlns:a="http://schemas.openxmlformats.org/drawingml/2006/main" xmlns:r="http://schemas.openxmlformats.org/officeDocument/2006/relationships" xmlns:p="http://schemas.openxmlformats.org/presentationml/2006/main">
+  <p:cSld>
+    <p:spTree>
+      <p:nvGrpSpPr>
+        <p:cNvPr id="1" name=""/>
+        <p:cNvGrpSpPr/>
+        <p:nvPr/>
+      </p:nvGrpSpPr>
+      <p:grpSpPr>
+        <a:xfrm>
+          <a:off x="0" y="0"/>
+          <a:ext cx="0" cy="0"/>
+          <a:chOff x="0" y="0"/>
+          <a:chExt cx="0" cy="0"/>
+        </a:xfrm>
+      </p:grpSpPr>
+      <p:sp>
+        <p:nvSpPr>
+          <p:cNvPr id="2" name="幻灯片图像占位符 1"/>
+          <p:cNvSpPr>
+            <a:spLocks noGrp="1" noRot="1" noChangeAspect="1"/>
+          </p:cNvSpPr>
+          <p:nvPr>
+            <p:ph type="sldImg"/>
+          </p:nvPr>
+        </p:nvSpPr>
+        <p:spPr/>
+      </p:sp>
+      <p:sp>
+        <p:nvSpPr>
+          <p:cNvPr id="3" name="备注占位符 2"/>
+          <p:cNvSpPr>
+            <a:spLocks noGrp="1"/>
+          </p:cNvSpPr>
+          <p:nvPr>
+            <p:ph type="body" idx="1"/>
+          </p:nvPr>
+        </p:nvSpPr>
+        <p:spPr/>
+        <p:txBody>
+          <a:bodyPr/>
+          <a:lstStyle/>
+          <a:p>
+            <a:r>
+              <a:rPr lang="zh-CN" altLang="en-US" dirty="0" smtClean="0"/>
+              <a:t>中间那条线</a:t>
+            </a:r>
+            <a:r>
+              <a:rPr lang="en-US" altLang="zh-CN" dirty="0" err="1" smtClean="0"/>
+              <a:t>wx+b</a:t>
+            </a:r>
+            <a:r>
+              <a:rPr lang="en-US" altLang="zh-CN" dirty="0" smtClean="0"/>
+              <a:t>=0</a:t>
+            </a:r>
+            <a:r>
+              <a:rPr lang="zh-CN" altLang="en-US" dirty="0" smtClean="0"/>
+              <a:t>是通过原点的直线，</a:t>
+            </a:r>
+            <a:r>
+              <a:rPr lang="en-US" altLang="zh-CN" dirty="0" smtClean="0"/>
+              <a:t>M</a:t>
+            </a:r>
+            <a:r>
+              <a:rPr lang="zh-CN" altLang="en-US" baseline="0" dirty="0" smtClean="0"/>
+              <a:t> </a:t>
+            </a:r>
+            <a:r>
+              <a:rPr lang="en-US" altLang="zh-CN" baseline="0" dirty="0" smtClean="0"/>
+              <a:t>= </a:t>
+            </a:r>
+            <a:r>
+              <a:rPr lang="zh-CN" altLang="en-US" baseline="0" dirty="0" smtClean="0"/>
+              <a:t>原点到两条分界面 </a:t>
+            </a:r>
+            <a:r>
+              <a:rPr lang="en-US" altLang="zh-CN" baseline="0" dirty="0" err="1" smtClean="0"/>
+              <a:t>wx+b</a:t>
+            </a:r>
+            <a:r>
+              <a:rPr lang="en-US" altLang="zh-CN" baseline="0" dirty="0" smtClean="0"/>
+              <a:t>=1</a:t>
+            </a:r>
+            <a:r>
+              <a:rPr lang="zh-CN" altLang="en-US" baseline="0" dirty="0" smtClean="0"/>
+              <a:t>，</a:t>
+            </a:r>
+            <a:r>
+              <a:rPr lang="en-US" altLang="zh-CN" baseline="0" dirty="0" err="1" smtClean="0"/>
+              <a:t>wx+b</a:t>
+            </a:r>
+            <a:r>
+              <a:rPr lang="en-US" altLang="zh-CN" baseline="0" dirty="0" smtClean="0"/>
+              <a:t>=-1</a:t>
+            </a:r>
+            <a:r>
+              <a:rPr lang="zh-CN" altLang="en-US" baseline="0" dirty="0" smtClean="0"/>
+              <a:t>的距离之和 </a:t>
+            </a:r>
+            <a:endParaRPr lang="en-US" altLang="zh-CN" baseline="0" dirty="0" smtClean="0"/>
+          </a:p>
+          <a:p>
+            <a:endParaRPr lang="en-US" altLang="zh-CN" dirty="0" smtClean="0"/>
+          </a:p>
+          <a:p>
+            <a:r>
+              <a:rPr lang="zh-CN" altLang="en-US" dirty="0" smtClean="0"/>
+              <a:t>由前面基础知识，原点到超平面的距离</a:t>
+            </a:r>
+            <a:r>
+              <a:rPr lang="en-US" altLang="zh-CN" baseline="0" dirty="0" smtClean="0"/>
+              <a:t> = |g(x)|/||w||</a:t>
+            </a:r>
+          </a:p>
+          <a:p>
+            <a:r>
+              <a:rPr lang="zh-CN" altLang="en-US" dirty="0" smtClean="0"/>
+              <a:t>而 </a:t>
+            </a:r>
+            <a:r>
+              <a:rPr lang="en-US" altLang="zh-CN" dirty="0" smtClean="0"/>
+              <a:t>|g(x)|</a:t>
+            </a:r>
+            <a:r>
+              <a:rPr lang="en-US" altLang="zh-CN" baseline="0" dirty="0" smtClean="0"/>
+              <a:t> = 1</a:t>
+            </a:r>
+          </a:p>
+          <a:p>
+            <a:r>
+              <a:rPr lang="zh-CN" altLang="en-US" baseline="0" dirty="0" smtClean="0"/>
+              <a:t>所以，</a:t>
+            </a:r>
+            <a:r>
+              <a:rPr lang="en-US" altLang="zh-CN" baseline="0" dirty="0" smtClean="0"/>
+              <a:t>M=2/||w||</a:t>
+            </a:r>
+          </a:p>
+          <a:p>
+            <a:endParaRPr lang="en-US" altLang="zh-CN" baseline="0" dirty="0" smtClean="0"/>
+          </a:p>
+          <a:p>
+            <a:endParaRPr lang="zh-CN" altLang="en-US" dirty="0"/>
+          </a:p>
+        </p:txBody>
+      </p:sp>
+      <p:sp>
+        <p:nvSpPr>
+          <p:cNvPr id="4" name="灯片编号占位符 3"/>
+          <p:cNvSpPr>
+            <a:spLocks noGrp="1"/>
+          </p:cNvSpPr>
+          <p:nvPr>
+            <p:ph type="sldNum" sz="quarter" idx="10"/>
+          </p:nvPr>
+        </p:nvSpPr>
+        <p:spPr/>
+        <p:txBody>
+          <a:bodyPr/>
+          <a:lstStyle/>
+          <a:p>
+            <a:pPr>
+              <a:defRPr/>
+            </a:pPr>
+            <a:fld id="{0486AD57-67ED-4140-9F70-67C055736CF8}" type="slidenum">
+              <a:rPr lang="zh-CN" altLang="en-US" smtClean="0"/>
+              <a:pPr>
+                <a:defRPr/>
+              </a:pPr>
+              <a:t>9</a:t>
+            </a:fld>
+            <a:endParaRPr lang="zh-CN" altLang="en-US"/>
+          </a:p>
+        </p:txBody>
+      </p:sp>
+    </p:spTree>
+    <p:extLst>
+      <p:ext uri="{BB962C8B-B14F-4D97-AF65-F5344CB8AC3E}">
+        <p14:creationId xmlns:p14="http://schemas.microsoft.com/office/powerpoint/2010/main" val="1335597842"/>
+      </p:ext>
+    </p:extLst>
+  </p:cSld>
+  <p:clrMapOvr>
+    <a:masterClrMapping/>
+  </p:clrMapOvr>
+</p:notes>
+</file>
+
+<file path=ppt/notesSlides/notesSlide3.xml><?xml version="1.0" encoding="utf-8"?>
+<p:notes xmlns:a="http://schemas.openxmlformats.org/drawingml/2006/main" xmlns:r="http://schemas.openxmlformats.org/officeDocument/2006/relationships" xmlns:p="http://schemas.openxmlformats.org/presentationml/2006/main">
+  <p:cSld>
+    <p:spTree>
+      <p:nvGrpSpPr>
+        <p:cNvPr id="1" name=""/>
+        <p:cNvGrpSpPr/>
+        <p:nvPr/>
+      </p:nvGrpSpPr>
+      <p:grpSpPr>
+        <a:xfrm>
+          <a:off x="0" y="0"/>
+          <a:ext cx="0" cy="0"/>
+          <a:chOff x="0" y="0"/>
+          <a:chExt cx="0" cy="0"/>
+        </a:xfrm>
+      </p:grpSpPr>
+      <p:sp>
+        <p:nvSpPr>
+          <p:cNvPr id="2" name="幻灯片图像占位符 1"/>
+          <p:cNvSpPr>
+            <a:spLocks noGrp="1" noRot="1" noChangeAspect="1"/>
+          </p:cNvSpPr>
+          <p:nvPr>
+            <p:ph type="sldImg"/>
+          </p:nvPr>
+        </p:nvSpPr>
+        <p:spPr/>
+      </p:sp>
+      <p:sp>
+        <p:nvSpPr>
+          <p:cNvPr id="3" name="备注占位符 2"/>
+          <p:cNvSpPr>
+            <a:spLocks noGrp="1"/>
+          </p:cNvSpPr>
+          <p:nvPr>
+            <p:ph type="body" idx="1"/>
+          </p:nvPr>
+        </p:nvSpPr>
+        <p:spPr/>
+        <p:txBody>
+          <a:bodyPr/>
+          <a:lstStyle/>
+          <a:p>
+            <a:r>
+              <a:rPr lang="zh-CN" altLang="en-US" dirty="0" smtClean="0"/>
+              <a:t>一维不可分，可以将其变换到二维空间中</a:t>
+            </a:r>
+            <a:r>
+              <a:rPr lang="zh-CN" altLang="en-US" smtClean="0"/>
+              <a:t>，使其可分</a:t>
+            </a:r>
+            <a:endParaRPr lang="zh-CN" altLang="en-US" dirty="0"/>
+          </a:p>
+        </p:txBody>
+      </p:sp>
+      <p:sp>
+        <p:nvSpPr>
+          <p:cNvPr id="4" name="灯片编号占位符 3"/>
+          <p:cNvSpPr>
+            <a:spLocks noGrp="1"/>
+          </p:cNvSpPr>
+          <p:nvPr>
+            <p:ph type="sldNum" sz="quarter" idx="10"/>
+          </p:nvPr>
+        </p:nvSpPr>
+        <p:spPr/>
+        <p:txBody>
+          <a:bodyPr/>
+          <a:lstStyle/>
+          <a:p>
+            <a:pPr>
+              <a:defRPr/>
+            </a:pPr>
+            <a:fld id="{0486AD57-67ED-4140-9F70-67C055736CF8}" type="slidenum">
+              <a:rPr lang="zh-CN" altLang="en-US" smtClean="0"/>
+              <a:pPr>
+                <a:defRPr/>
+              </a:pPr>
+              <a:t>18</a:t>
+            </a:fld>
+            <a:endParaRPr lang="zh-CN" altLang="en-US"/>
+          </a:p>
+        </p:txBody>
+      </p:sp>
+    </p:spTree>
+    <p:extLst>
+      <p:ext uri="{BB962C8B-B14F-4D97-AF65-F5344CB8AC3E}">
+        <p14:creationId xmlns:p14="http://schemas.microsoft.com/office/powerpoint/2010/main" val="3410394667"/>
+      </p:ext>
+    </p:extLst>
+  </p:cSld>
+  <p:clrMapOvr>
+    <a:masterClrMapping/>
+  </p:clrMapOvr>
+</p:notes>
+</file>
+
+<file path=ppt/notesSlides/notesSlide4.xml><?xml version="1.0" encoding="utf-8"?>
+<p:notes xmlns:a="http://schemas.openxmlformats.org/drawingml/2006/main" xmlns:r="http://schemas.openxmlformats.org/officeDocument/2006/relationships" xmlns:p="http://schemas.openxmlformats.org/presentationml/2006/main">
+  <p:cSld>
+    <p:spTree>
+      <p:nvGrpSpPr>
+        <p:cNvPr id="1" name=""/>
+        <p:cNvGrpSpPr/>
+        <p:nvPr/>
+      </p:nvGrpSpPr>
+      <p:grpSpPr>
+        <a:xfrm>
+          <a:off x="0" y="0"/>
+          <a:ext cx="0" cy="0"/>
+          <a:chOff x="0" y="0"/>
+          <a:chExt cx="0" cy="0"/>
+        </a:xfrm>
+      </p:grpSpPr>
+      <p:sp>
+        <p:nvSpPr>
+          <p:cNvPr id="2" name="幻灯片图像占位符 1"/>
+          <p:cNvSpPr>
+            <a:spLocks noGrp="1" noRot="1" noChangeAspect="1"/>
+          </p:cNvSpPr>
+          <p:nvPr>
+            <p:ph type="sldImg"/>
+          </p:nvPr>
+        </p:nvSpPr>
+        <p:spPr/>
+      </p:sp>
+      <p:sp>
+        <p:nvSpPr>
+          <p:cNvPr id="3" name="备注占位符 2"/>
+          <p:cNvSpPr>
+            <a:spLocks noGrp="1"/>
+          </p:cNvSpPr>
+          <p:nvPr>
+            <p:ph type="body" idx="1"/>
+          </p:nvPr>
+        </p:nvSpPr>
+        <p:spPr/>
+        <p:txBody>
+          <a:bodyPr/>
+          <a:lstStyle/>
+          <a:p>
+            <a:r>
               <a:rPr lang="en-US" altLang="zh-CN" i="1" dirty="0" err="1" smtClean="0">
                 <a:effectLst/>
               </a:rPr>
@@ -4532,6 +4933,162 @@
     <p:extLst>
       <p:ext uri="{BB962C8B-B14F-4D97-AF65-F5344CB8AC3E}">
         <p14:creationId xmlns:p14="http://schemas.microsoft.com/office/powerpoint/2010/main" val="309112538"/>
+      </p:ext>
+    </p:extLst>
+  </p:cSld>
+  <p:clrMapOvr>
+    <a:masterClrMapping/>
+  </p:clrMapOvr>
+</p:notes>
+</file>
+
+<file path=ppt/notesSlides/notesSlide5.xml><?xml version="1.0" encoding="utf-8"?>
+<p:notes xmlns:a="http://schemas.openxmlformats.org/drawingml/2006/main" xmlns:r="http://schemas.openxmlformats.org/officeDocument/2006/relationships" xmlns:p="http://schemas.openxmlformats.org/presentationml/2006/main">
+  <p:cSld>
+    <p:spTree>
+      <p:nvGrpSpPr>
+        <p:cNvPr id="1" name=""/>
+        <p:cNvGrpSpPr/>
+        <p:nvPr/>
+      </p:nvGrpSpPr>
+      <p:grpSpPr>
+        <a:xfrm>
+          <a:off x="0" y="0"/>
+          <a:ext cx="0" cy="0"/>
+          <a:chOff x="0" y="0"/>
+          <a:chExt cx="0" cy="0"/>
+        </a:xfrm>
+      </p:grpSpPr>
+      <p:sp>
+        <p:nvSpPr>
+          <p:cNvPr id="2" name="幻灯片图像占位符 1"/>
+          <p:cNvSpPr>
+            <a:spLocks noGrp="1" noRot="1" noChangeAspect="1"/>
+          </p:cNvSpPr>
+          <p:nvPr>
+            <p:ph type="sldImg"/>
+          </p:nvPr>
+        </p:nvSpPr>
+        <p:spPr/>
+      </p:sp>
+      <p:sp>
+        <p:nvSpPr>
+          <p:cNvPr id="3" name="备注占位符 2"/>
+          <p:cNvSpPr>
+            <a:spLocks noGrp="1"/>
+          </p:cNvSpPr>
+          <p:nvPr>
+            <p:ph type="body" idx="1"/>
+          </p:nvPr>
+        </p:nvSpPr>
+        <p:spPr/>
+        <p:txBody>
+          <a:bodyPr/>
+          <a:lstStyle/>
+          <a:p>
+            <a:r>
+              <a:rPr lang="en-US" altLang="zh-CN" dirty="0" err="1" smtClean="0"/>
+              <a:t>E</a:t>
+            </a:r>
+            <a:r>
+              <a:rPr lang="en-US" altLang="zh-CN" baseline="-25000" dirty="0" err="1" smtClean="0"/>
+              <a:t>test</a:t>
+            </a:r>
+            <a:r>
+              <a:rPr lang="zh-CN" altLang="en-US" dirty="0" smtClean="0"/>
+              <a:t>：测试误差</a:t>
+            </a:r>
+            <a:endParaRPr lang="en-US" altLang="zh-CN" dirty="0" smtClean="0"/>
+          </a:p>
+          <a:p>
+            <a:r>
+              <a:rPr lang="en-US" altLang="zh-CN" dirty="0" err="1" smtClean="0"/>
+              <a:t>E</a:t>
+            </a:r>
+            <a:r>
+              <a:rPr lang="en-US" altLang="zh-CN" baseline="-25000" dirty="0" err="1" smtClean="0"/>
+              <a:t>train</a:t>
+            </a:r>
+            <a:r>
+              <a:rPr lang="zh-CN" altLang="en-US" dirty="0" smtClean="0"/>
+              <a:t>：训练误差</a:t>
+            </a:r>
+            <a:endParaRPr lang="en-US" altLang="zh-CN" dirty="0" smtClean="0"/>
+          </a:p>
+          <a:p>
+            <a:endParaRPr lang="en-US" altLang="zh-CN" dirty="0" smtClean="0"/>
+          </a:p>
+          <a:p>
+            <a:r>
+              <a:rPr lang="zh-CN" altLang="en-US" dirty="0" smtClean="0"/>
+              <a:t>模型越复杂，</a:t>
+            </a:r>
+            <a:r>
+              <a:rPr lang="en-US" altLang="zh-CN" dirty="0" smtClean="0"/>
+              <a:t>h</a:t>
+            </a:r>
+            <a:r>
+              <a:rPr lang="zh-CN" altLang="en-US" dirty="0" smtClean="0"/>
+              <a:t>越大，训练误差 与测试误差之间的差别越大，即风险越大。</a:t>
+            </a:r>
+            <a:endParaRPr lang="en-US" altLang="zh-CN" dirty="0" smtClean="0"/>
+          </a:p>
+          <a:p>
+            <a:r>
+              <a:rPr lang="zh-CN" altLang="en-US" dirty="0" smtClean="0"/>
+              <a:t>所以，训练误差一样的情况下，复杂度高的模型，比复杂度低的模型，测试误差大的风险大  </a:t>
+            </a:r>
+            <a:r>
+              <a:rPr lang="en-US" altLang="zh-CN" dirty="0" smtClean="0"/>
+              <a:t>--- </a:t>
+            </a:r>
+            <a:r>
+              <a:rPr lang="zh-CN" altLang="en-US" smtClean="0"/>
+              <a:t>选复杂度低的</a:t>
+            </a:r>
+            <a:endParaRPr lang="en-US" altLang="zh-CN" dirty="0" smtClean="0"/>
+          </a:p>
+          <a:p>
+            <a:endParaRPr lang="en-US" altLang="zh-CN" dirty="0" smtClean="0"/>
+          </a:p>
+          <a:p>
+            <a:endParaRPr lang="zh-CN" altLang="en-US" dirty="0"/>
+          </a:p>
+        </p:txBody>
+      </p:sp>
+      <p:sp>
+        <p:nvSpPr>
+          <p:cNvPr id="4" name="灯片编号占位符 3"/>
+          <p:cNvSpPr>
+            <a:spLocks noGrp="1"/>
+          </p:cNvSpPr>
+          <p:nvPr>
+            <p:ph type="sldNum" sz="quarter" idx="10"/>
+          </p:nvPr>
+        </p:nvSpPr>
+        <p:spPr/>
+        <p:txBody>
+          <a:bodyPr/>
+          <a:lstStyle/>
+          <a:p>
+            <a:pPr>
+              <a:defRPr/>
+            </a:pPr>
+            <a:fld id="{0486AD57-67ED-4140-9F70-67C055736CF8}" type="slidenum">
+              <a:rPr lang="zh-CN" altLang="en-US" smtClean="0"/>
+              <a:pPr>
+                <a:defRPr/>
+              </a:pPr>
+              <a:t>35</a:t>
+            </a:fld>
+            <a:endParaRPr lang="zh-CN" altLang="en-US"/>
+          </a:p>
+        </p:txBody>
+      </p:sp>
+    </p:spTree>
+    <p:extLst>
+      <p:ext uri="{BB962C8B-B14F-4D97-AF65-F5344CB8AC3E}">
+        <p14:creationId xmlns:p14="http://schemas.microsoft.com/office/powerpoint/2010/main" val="2608444711"/>
       </p:ext>
     </p:extLst>
   </p:cSld>
@@ -13322,7 +13879,7 @@
           <a:graphicData uri="http://schemas.openxmlformats.org/presentationml/2006/ole">
             <mc:AlternateContent xmlns:mc="http://schemas.openxmlformats.org/markup-compatibility/2006">
               <mc:Choice xmlns:v="urn:schemas-microsoft-com:vml" Requires="v">
-                <p:oleObj spid="_x0000_s170678" name="Equation" r:id="rId3" imgW="1587500" imgH="228600" progId="Equation.3">
+                <p:oleObj spid="_x0000_s170738" name="Equation" r:id="rId3" imgW="1587500" imgH="228600" progId="Equation.3">
                   <p:embed/>
                 </p:oleObj>
               </mc:Choice>
@@ -13415,7 +13972,7 @@
           <a:graphicData uri="http://schemas.openxmlformats.org/presentationml/2006/ole">
             <mc:AlternateContent xmlns:mc="http://schemas.openxmlformats.org/markup-compatibility/2006">
               <mc:Choice xmlns:v="urn:schemas-microsoft-com:vml" Requires="v">
-                <p:oleObj spid="_x0000_s170679" name="Equation" r:id="rId5" imgW="1612900" imgH="228600" progId="Equation.3">
+                <p:oleObj spid="_x0000_s170739" name="Equation" r:id="rId5" imgW="1612900" imgH="228600" progId="Equation.3">
                   <p:embed/>
                 </p:oleObj>
               </mc:Choice>
@@ -13508,7 +14065,7 @@
           <a:graphicData uri="http://schemas.openxmlformats.org/presentationml/2006/ole">
             <mc:AlternateContent xmlns:mc="http://schemas.openxmlformats.org/markup-compatibility/2006">
               <mc:Choice xmlns:v="urn:schemas-microsoft-com:vml" Requires="v">
-                <p:oleObj spid="_x0000_s170680" name="Equation" r:id="rId7" imgW="1193800" imgH="228600" progId="Equation.3">
+                <p:oleObj spid="_x0000_s170740" name="Equation" r:id="rId7" imgW="1193800" imgH="228600" progId="Equation.3">
                   <p:embed/>
                 </p:oleObj>
               </mc:Choice>
@@ -13622,7 +14179,7 @@
           <a:graphicData uri="http://schemas.openxmlformats.org/presentationml/2006/ole">
             <mc:AlternateContent xmlns:mc="http://schemas.openxmlformats.org/markup-compatibility/2006">
               <mc:Choice xmlns:v="urn:schemas-microsoft-com:vml" Requires="v">
-                <p:oleObj spid="_x0000_s170681" name="公式" r:id="rId9" imgW="1714500" imgH="444500" progId="Equation.3">
+                <p:oleObj spid="_x0000_s170741" name="公式" r:id="rId9" imgW="1714500" imgH="444500" progId="Equation.3">
                   <p:embed/>
                 </p:oleObj>
               </mc:Choice>
@@ -13692,7 +14249,7 @@
           <a:graphicData uri="http://schemas.openxmlformats.org/presentationml/2006/ole">
             <mc:AlternateContent xmlns:mc="http://schemas.openxmlformats.org/markup-compatibility/2006">
               <mc:Choice xmlns:v="urn:schemas-microsoft-com:vml" Requires="v">
-                <p:oleObj spid="_x0000_s170682" name="Equation" r:id="rId11" imgW="888614" imgH="393529" progId="Equation.3">
+                <p:oleObj spid="_x0000_s170742" name="Equation" r:id="rId11" imgW="888614" imgH="393529" progId="Equation.3">
                   <p:embed/>
                 </p:oleObj>
               </mc:Choice>
@@ -13785,7 +14342,7 @@
           <a:graphicData uri="http://schemas.openxmlformats.org/presentationml/2006/ole">
             <mc:AlternateContent xmlns:mc="http://schemas.openxmlformats.org/markup-compatibility/2006">
               <mc:Choice xmlns:v="urn:schemas-microsoft-com:vml" Requires="v">
-                <p:oleObj spid="_x0000_s170683" name="Equation" r:id="rId13" imgW="977900" imgH="228600" progId="Equation.3">
+                <p:oleObj spid="_x0000_s170743" name="Equation" r:id="rId13" imgW="977900" imgH="228600" progId="Equation.3">
                   <p:embed/>
                 </p:oleObj>
               </mc:Choice>
@@ -14534,7 +15091,7 @@
           <a:graphicData uri="http://schemas.openxmlformats.org/presentationml/2006/ole">
             <mc:AlternateContent xmlns:mc="http://schemas.openxmlformats.org/markup-compatibility/2006">
               <mc:Choice xmlns:v="urn:schemas-microsoft-com:vml" Requires="v">
-                <p:oleObj spid="_x0000_s171355" name="Equation" r:id="rId3" imgW="2451100" imgH="431800" progId="">
+                <p:oleObj spid="_x0000_s171385" name="Equation" r:id="rId3" imgW="2451100" imgH="431800" progId="">
                   <p:embed/>
                 </p:oleObj>
               </mc:Choice>
@@ -14604,7 +15161,7 @@
           <a:graphicData uri="http://schemas.openxmlformats.org/presentationml/2006/ole">
             <mc:AlternateContent xmlns:mc="http://schemas.openxmlformats.org/markup-compatibility/2006">
               <mc:Choice xmlns:v="urn:schemas-microsoft-com:vml" Requires="v">
-                <p:oleObj spid="_x0000_s171356" name="Equation" r:id="rId5" imgW="1536700" imgH="889000" progId="">
+                <p:oleObj spid="_x0000_s171386" name="Equation" r:id="rId5" imgW="1536700" imgH="889000" progId="">
                   <p:embed/>
                 </p:oleObj>
               </mc:Choice>
@@ -14718,7 +15275,7 @@
           <a:graphicData uri="http://schemas.openxmlformats.org/presentationml/2006/ole">
             <mc:AlternateContent xmlns:mc="http://schemas.openxmlformats.org/markup-compatibility/2006">
               <mc:Choice xmlns:v="urn:schemas-microsoft-com:vml" Requires="v">
-                <p:oleObj spid="_x0000_s171357" name="Equation" r:id="rId7" imgW="2679700" imgH="1231900" progId="">
+                <p:oleObj spid="_x0000_s171387" name="Equation" r:id="rId7" imgW="2679700" imgH="1231900" progId="">
                   <p:embed/>
                 </p:oleObj>
               </mc:Choice>
@@ -15321,7 +15878,7 @@
           <a:graphicData uri="http://schemas.openxmlformats.org/presentationml/2006/ole">
             <mc:AlternateContent xmlns:mc="http://schemas.openxmlformats.org/markup-compatibility/2006">
               <mc:Choice xmlns:v="urn:schemas-microsoft-com:vml" Requires="v">
-                <p:oleObj spid="_x0000_s191835" name="Equation" r:id="rId3" imgW="1384300" imgH="431800" progId="">
+                <p:oleObj spid="_x0000_s191865" name="Equation" r:id="rId3" imgW="1384300" imgH="431800" progId="">
                   <p:embed/>
                 </p:oleObj>
               </mc:Choice>
@@ -15465,7 +16022,7 @@
           <a:graphicData uri="http://schemas.openxmlformats.org/presentationml/2006/ole">
             <mc:AlternateContent xmlns:mc="http://schemas.openxmlformats.org/markup-compatibility/2006">
               <mc:Choice xmlns:v="urn:schemas-microsoft-com:vml" Requires="v">
-                <p:oleObj spid="_x0000_s191836" name="Equation" r:id="rId5" imgW="2590800" imgH="203200" progId="">
+                <p:oleObj spid="_x0000_s191866" name="Equation" r:id="rId5" imgW="2590800" imgH="203200" progId="">
                   <p:embed/>
                 </p:oleObj>
               </mc:Choice>
@@ -15541,7 +16098,7 @@
           <a:graphicData uri="http://schemas.openxmlformats.org/presentationml/2006/ole">
             <mc:AlternateContent xmlns:mc="http://schemas.openxmlformats.org/markup-compatibility/2006">
               <mc:Choice xmlns:v="urn:schemas-microsoft-com:vml" Requires="v">
-                <p:oleObj spid="_x0000_s191837" name="Equation" r:id="rId7" imgW="1930400" imgH="1727200" progId="">
+                <p:oleObj spid="_x0000_s191867" name="Equation" r:id="rId7" imgW="1930400" imgH="1727200" progId="">
                   <p:embed/>
                 </p:oleObj>
               </mc:Choice>
@@ -16159,7 +16716,7 @@
           <a:graphicData uri="http://schemas.openxmlformats.org/presentationml/2006/ole">
             <mc:AlternateContent xmlns:mc="http://schemas.openxmlformats.org/markup-compatibility/2006">
               <mc:Choice xmlns:v="urn:schemas-microsoft-com:vml" Requires="v">
-                <p:oleObj spid="_x0000_s211981" name="Equation" r:id="rId3" imgW="177569" imgH="215619" progId="">
+                <p:oleObj spid="_x0000_s212071" name="Equation" r:id="rId3" imgW="177569" imgH="215619" progId="">
                   <p:embed/>
                 </p:oleObj>
               </mc:Choice>
@@ -16229,7 +16786,7 @@
           <a:graphicData uri="http://schemas.openxmlformats.org/presentationml/2006/ole">
             <mc:AlternateContent xmlns:mc="http://schemas.openxmlformats.org/markup-compatibility/2006">
               <mc:Choice xmlns:v="urn:schemas-microsoft-com:vml" Requires="v">
-                <p:oleObj spid="_x0000_s211982" name="Equation" r:id="rId5" imgW="190335" imgH="215713" progId="">
+                <p:oleObj spid="_x0000_s212072" name="Equation" r:id="rId5" imgW="190335" imgH="215713" progId="">
                   <p:embed/>
                 </p:oleObj>
               </mc:Choice>
@@ -16299,7 +16856,7 @@
           <a:graphicData uri="http://schemas.openxmlformats.org/presentationml/2006/ole">
             <mc:AlternateContent xmlns:mc="http://schemas.openxmlformats.org/markup-compatibility/2006">
               <mc:Choice xmlns:v="urn:schemas-microsoft-com:vml" Requires="v">
-                <p:oleObj spid="_x0000_s211983" name="Equation" r:id="rId7" imgW="2235200" imgH="431800" progId="">
+                <p:oleObj spid="_x0000_s212073" name="Equation" r:id="rId7" imgW="2235200" imgH="431800" progId="">
                   <p:embed/>
                 </p:oleObj>
               </mc:Choice>
@@ -16369,7 +16926,7 @@
           <a:graphicData uri="http://schemas.openxmlformats.org/presentationml/2006/ole">
             <mc:AlternateContent xmlns:mc="http://schemas.openxmlformats.org/markup-compatibility/2006">
               <mc:Choice xmlns:v="urn:schemas-microsoft-com:vml" Requires="v">
-                <p:oleObj spid="_x0000_s211984" name="Equation" r:id="rId9" imgW="3289300" imgH="482600" progId="">
+                <p:oleObj spid="_x0000_s212074" name="Equation" r:id="rId9" imgW="3289300" imgH="482600" progId="">
                   <p:embed/>
                 </p:oleObj>
               </mc:Choice>
@@ -16439,7 +16996,7 @@
           <a:graphicData uri="http://schemas.openxmlformats.org/presentationml/2006/ole">
             <mc:AlternateContent xmlns:mc="http://schemas.openxmlformats.org/markup-compatibility/2006">
               <mc:Choice xmlns:v="urn:schemas-microsoft-com:vml" Requires="v">
-                <p:oleObj spid="_x0000_s211985" name="Equation" r:id="rId11" imgW="2451100" imgH="482600" progId="">
+                <p:oleObj spid="_x0000_s212075" name="Equation" r:id="rId11" imgW="2451100" imgH="482600" progId="">
                   <p:embed/>
                 </p:oleObj>
               </mc:Choice>
@@ -16515,7 +17072,7 @@
           <a:graphicData uri="http://schemas.openxmlformats.org/presentationml/2006/ole">
             <mc:AlternateContent xmlns:mc="http://schemas.openxmlformats.org/markup-compatibility/2006">
               <mc:Choice xmlns:v="urn:schemas-microsoft-com:vml" Requires="v">
-                <p:oleObj spid="_x0000_s211986" name="Equation" r:id="rId13" imgW="863225" imgH="215806" progId="">
+                <p:oleObj spid="_x0000_s212076" name="Equation" r:id="rId13" imgW="863225" imgH="215806" progId="">
                   <p:embed/>
                 </p:oleObj>
               </mc:Choice>
@@ -16585,7 +17142,7 @@
           <a:graphicData uri="http://schemas.openxmlformats.org/presentationml/2006/ole">
             <mc:AlternateContent xmlns:mc="http://schemas.openxmlformats.org/markup-compatibility/2006">
               <mc:Choice xmlns:v="urn:schemas-microsoft-com:vml" Requires="v">
-                <p:oleObj spid="_x0000_s211987" name="Equation" r:id="rId15" imgW="2882900" imgH="901700" progId="">
+                <p:oleObj spid="_x0000_s212077" name="Equation" r:id="rId15" imgW="2882900" imgH="901700" progId="">
                   <p:embed/>
                 </p:oleObj>
               </mc:Choice>
@@ -16766,7 +17323,7 @@
           <a:graphicData uri="http://schemas.openxmlformats.org/presentationml/2006/ole">
             <mc:AlternateContent xmlns:mc="http://schemas.openxmlformats.org/markup-compatibility/2006">
               <mc:Choice xmlns:v="urn:schemas-microsoft-com:vml" Requires="v">
-                <p:oleObj spid="_x0000_s211988" name="Equation" r:id="rId17" imgW="850531" imgH="215806" progId="">
+                <p:oleObj spid="_x0000_s212078" name="Equation" r:id="rId17" imgW="850531" imgH="215806" progId="">
                   <p:embed/>
                 </p:oleObj>
               </mc:Choice>
@@ -16842,7 +17399,7 @@
           <a:graphicData uri="http://schemas.openxmlformats.org/presentationml/2006/ole">
             <mc:AlternateContent xmlns:mc="http://schemas.openxmlformats.org/markup-compatibility/2006">
               <mc:Choice xmlns:v="urn:schemas-microsoft-com:vml" Requires="v">
-                <p:oleObj spid="_x0000_s211989" name="Equation" r:id="rId19" imgW="1269449" imgH="444307" progId="">
+                <p:oleObj spid="_x0000_s212079" name="Equation" r:id="rId19" imgW="1269449" imgH="444307" progId="">
                   <p:embed/>
                 </p:oleObj>
               </mc:Choice>
@@ -18902,7 +19459,7 @@
           <a:graphicData uri="http://schemas.openxmlformats.org/presentationml/2006/ole">
             <mc:AlternateContent xmlns:mc="http://schemas.openxmlformats.org/markup-compatibility/2006">
               <mc:Choice xmlns:v="urn:schemas-microsoft-com:vml" Requires="v">
-                <p:oleObj spid="_x0000_s190814" name="公式" r:id="rId3" imgW="1358900" imgH="228600" progId="Equation.3">
+                <p:oleObj spid="_x0000_s190844" name="公式" r:id="rId3" imgW="1358900" imgH="228600" progId="Equation.3">
                   <p:embed/>
                 </p:oleObj>
               </mc:Choice>
@@ -18978,7 +19535,7 @@
           <a:graphicData uri="http://schemas.openxmlformats.org/presentationml/2006/ole">
             <mc:AlternateContent xmlns:mc="http://schemas.openxmlformats.org/markup-compatibility/2006">
               <mc:Choice xmlns:v="urn:schemas-microsoft-com:vml" Requires="v">
-                <p:oleObj spid="_x0000_s190815" name="Equation" r:id="rId5" imgW="1435100" imgH="660400" progId="Equation.3">
+                <p:oleObj spid="_x0000_s190845" name="Equation" r:id="rId5" imgW="1435100" imgH="660400" progId="Equation.3">
                   <p:embed/>
                 </p:oleObj>
               </mc:Choice>
@@ -19077,7 +19634,7 @@
           <a:graphicData uri="http://schemas.openxmlformats.org/presentationml/2006/ole">
             <mc:AlternateContent xmlns:mc="http://schemas.openxmlformats.org/markup-compatibility/2006">
               <mc:Choice xmlns:v="urn:schemas-microsoft-com:vml" Requires="v">
-                <p:oleObj spid="_x0000_s190816" name="Equation" r:id="rId7" imgW="3530600" imgH="431800" progId="Equation.3">
+                <p:oleObj spid="_x0000_s190846" name="Equation" r:id="rId7" imgW="3530600" imgH="431800" progId="Equation.3">
                   <p:embed/>
                 </p:oleObj>
               </mc:Choice>
@@ -19550,7 +20107,7 @@
           <a:graphicData uri="http://schemas.openxmlformats.org/presentationml/2006/ole">
             <mc:AlternateContent xmlns:mc="http://schemas.openxmlformats.org/markup-compatibility/2006">
               <mc:Choice xmlns:v="urn:schemas-microsoft-com:vml" Requires="v">
-                <p:oleObj spid="_x0000_s195910" name="Equation" r:id="rId3" imgW="3416300" imgH="419100" progId="">
+                <p:oleObj spid="_x0000_s195930" name="Equation" r:id="rId3" imgW="3416300" imgH="419100" progId="">
                   <p:embed/>
                 </p:oleObj>
               </mc:Choice>
@@ -19634,7 +20191,7 @@
           <a:graphicData uri="http://schemas.openxmlformats.org/presentationml/2006/ole">
             <mc:AlternateContent xmlns:mc="http://schemas.openxmlformats.org/markup-compatibility/2006">
               <mc:Choice xmlns:v="urn:schemas-microsoft-com:vml" Requires="v">
-                <p:oleObj spid="_x0000_s195911" name="公式" r:id="rId5" imgW="4165600" imgH="444500" progId="Equation.3">
+                <p:oleObj spid="_x0000_s195931" name="公式" r:id="rId5" imgW="4165600" imgH="444500" progId="Equation.3">
                   <p:embed/>
                 </p:oleObj>
               </mc:Choice>
@@ -19853,7 +20410,7 @@
                               <a:solidFill>
                                 <a:srgbClr val="000000"/>
                               </a:solidFill>
-                              <a:latin typeface="Cambria Math"/>
+                              <a:latin typeface="Cambria Math" panose="02040503050406030204" pitchFamily="18" charset="0"/>
                             </a:rPr>
                           </m:ctrlPr>
                         </m:fPr>
@@ -19874,7 +20431,7 @@
                                   <a:solidFill>
                                     <a:srgbClr val="000000"/>
                                   </a:solidFill>
-                                  <a:latin typeface="Cambria Math"/>
+                                  <a:latin typeface="Cambria Math" panose="02040503050406030204" pitchFamily="18" charset="0"/>
                                 </a:rPr>
                               </m:ctrlPr>
                             </m:sSubPr>
@@ -19919,7 +20476,7 @@
                                   <a:solidFill>
                                     <a:srgbClr val="000000"/>
                                   </a:solidFill>
-                                  <a:latin typeface="Cambria Math"/>
+                                  <a:latin typeface="Cambria Math" panose="02040503050406030204" pitchFamily="18" charset="0"/>
                                 </a:rPr>
                               </m:ctrlPr>
                             </m:sSubPr>
@@ -19994,7 +20551,7 @@
                               <a:solidFill>
                                 <a:srgbClr val="000000"/>
                               </a:solidFill>
-                              <a:latin typeface="Cambria Math"/>
+                              <a:latin typeface="Cambria Math" panose="02040503050406030204" pitchFamily="18" charset="0"/>
                               <a:ea typeface="Cambria Math"/>
                             </a:rPr>
                           </m:ctrlPr>
@@ -20041,7 +20598,7 @@
                               <a:solidFill>
                                 <a:srgbClr val="000000"/>
                               </a:solidFill>
-                              <a:latin typeface="Cambria Math"/>
+                              <a:latin typeface="Cambria Math" panose="02040503050406030204" pitchFamily="18" charset="0"/>
                               <a:ea typeface="Cambria Math"/>
                             </a:rPr>
                           </m:ctrlPr>
@@ -24877,8 +25434,8 @@
           </a:fontRef>
         </p:style>
       </p:cxnSp>
-      <mc:AlternateContent xmlns:mc="http://schemas.openxmlformats.org/markup-compatibility/2006">
-        <mc:Choice xmlns:a14="http://schemas.microsoft.com/office/drawing/2010/main" Requires="a14">
+      <mc:AlternateContent xmlns:mc="http://schemas.openxmlformats.org/markup-compatibility/2006" xmlns:a14="http://schemas.microsoft.com/office/drawing/2010/main">
+        <mc:Choice Requires="a14">
           <p:sp>
             <p:nvSpPr>
               <p:cNvPr id="53" name="TextBox 52"/>
@@ -24901,6 +25458,7 @@
               </a:bodyPr>
               <a:lstStyle/>
               <a:p>
+                <a:pPr/>
                 <a14:m>
                   <m:oMathPara xmlns:m="http://schemas.openxmlformats.org/officeDocument/2006/math">
                     <m:oMathParaPr>
@@ -24914,7 +25472,7 @@
                               <a:solidFill>
                                 <a:srgbClr val="000000"/>
                               </a:solidFill>
-                              <a:latin typeface="Cambria Math"/>
+                              <a:latin typeface="Cambria Math" panose="02040503050406030204" pitchFamily="18" charset="0"/>
                             </a:rPr>
                           </m:ctrlPr>
                         </m:sSupPr>
@@ -24926,7 +25484,7 @@
                                   <a:solidFill>
                                     <a:srgbClr val="000000"/>
                                   </a:solidFill>
-                                  <a:latin typeface="Cambria Math"/>
+                                  <a:latin typeface="Cambria Math" panose="02040503050406030204" pitchFamily="18" charset="0"/>
                                 </a:rPr>
                               </m:ctrlPr>
                             </m:sSubPr>
@@ -24982,7 +25540,7 @@
                               <a:solidFill>
                                 <a:srgbClr val="000000"/>
                               </a:solidFill>
-                              <a:latin typeface="Cambria Math"/>
+                              <a:latin typeface="Cambria Math" panose="02040503050406030204" pitchFamily="18" charset="0"/>
                             </a:rPr>
                           </m:ctrlPr>
                         </m:sSupPr>
@@ -24994,7 +25552,7 @@
                                   <a:solidFill>
                                     <a:srgbClr val="000000"/>
                                   </a:solidFill>
-                                  <a:latin typeface="Cambria Math"/>
+                                  <a:latin typeface="Cambria Math" panose="02040503050406030204" pitchFamily="18" charset="0"/>
                                 </a:rPr>
                               </m:ctrlPr>
                             </m:sSubPr>
@@ -25050,7 +25608,7 @@
                               <a:solidFill>
                                 <a:srgbClr val="000000"/>
                               </a:solidFill>
-                              <a:latin typeface="Cambria Math"/>
+                              <a:latin typeface="Cambria Math" panose="02040503050406030204" pitchFamily="18" charset="0"/>
                             </a:rPr>
                           </m:ctrlPr>
                         </m:sSupPr>
@@ -25089,7 +25647,7 @@
             </p:txBody>
           </p:sp>
         </mc:Choice>
-        <mc:Fallback>
+        <mc:Fallback xmlns="">
           <p:sp>
             <p:nvSpPr>
               <p:cNvPr id="53" name="TextBox 52"/>
@@ -27928,7 +28486,7 @@
           <a:graphicData uri="http://schemas.openxmlformats.org/presentationml/2006/ole">
             <mc:AlternateContent xmlns:mc="http://schemas.openxmlformats.org/markup-compatibility/2006">
               <mc:Choice xmlns:v="urn:schemas-microsoft-com:vml" Requires="v">
-                <p:oleObj spid="_x0000_s196844" name="Equation" r:id="rId3" imgW="1206500" imgH="4140200" progId="">
+                <p:oleObj spid="_x0000_s196864" name="Equation" r:id="rId3" imgW="1206500" imgH="4140200" progId="">
                   <p:embed/>
                 </p:oleObj>
               </mc:Choice>
@@ -28372,7 +28930,7 @@
           <a:graphicData uri="http://schemas.openxmlformats.org/presentationml/2006/ole">
             <mc:AlternateContent xmlns:mc="http://schemas.openxmlformats.org/markup-compatibility/2006">
               <mc:Choice xmlns:v="urn:schemas-microsoft-com:vml" Requires="v">
-                <p:oleObj spid="_x0000_s196845" name="Equation" r:id="rId5" imgW="1701800" imgH="419100" progId="">
+                <p:oleObj spid="_x0000_s196865" name="Equation" r:id="rId5" imgW="1701800" imgH="419100" progId="">
                   <p:embed/>
                 </p:oleObj>
               </mc:Choice>
@@ -28892,7 +29450,7 @@
           <a:graphicData uri="http://schemas.openxmlformats.org/presentationml/2006/ole">
             <mc:AlternateContent xmlns:mc="http://schemas.openxmlformats.org/markup-compatibility/2006">
               <mc:Choice xmlns:v="urn:schemas-microsoft-com:vml" Requires="v">
-                <p:oleObj spid="_x0000_s198325" name="Equation" r:id="rId3" imgW="2349500" imgH="4140200" progId="">
+                <p:oleObj spid="_x0000_s198385" name="Equation" r:id="rId3" imgW="2349500" imgH="4140200" progId="">
                   <p:embed/>
                 </p:oleObj>
               </mc:Choice>
@@ -29138,7 +29696,7 @@
           <a:graphicData uri="http://schemas.openxmlformats.org/presentationml/2006/ole">
             <mc:AlternateContent xmlns:mc="http://schemas.openxmlformats.org/markup-compatibility/2006">
               <mc:Choice xmlns:v="urn:schemas-microsoft-com:vml" Requires="v">
-                <p:oleObj spid="_x0000_s198326" name="Equation" r:id="rId5" imgW="88707" imgH="164742" progId="">
+                <p:oleObj spid="_x0000_s198386" name="Equation" r:id="rId5" imgW="88707" imgH="164742" progId="">
                   <p:embed/>
                 </p:oleObj>
               </mc:Choice>
@@ -29208,7 +29766,7 @@
           <a:graphicData uri="http://schemas.openxmlformats.org/presentationml/2006/ole">
             <mc:AlternateContent xmlns:mc="http://schemas.openxmlformats.org/markup-compatibility/2006">
               <mc:Choice xmlns:v="urn:schemas-microsoft-com:vml" Requires="v">
-                <p:oleObj spid="_x0000_s198327" name="Equation" r:id="rId7" imgW="533169" imgH="431613" progId="">
+                <p:oleObj spid="_x0000_s198387" name="Equation" r:id="rId7" imgW="533169" imgH="431613" progId="">
                   <p:embed/>
                 </p:oleObj>
               </mc:Choice>
@@ -29278,7 +29836,7 @@
           <a:graphicData uri="http://schemas.openxmlformats.org/presentationml/2006/ole">
             <mc:AlternateContent xmlns:mc="http://schemas.openxmlformats.org/markup-compatibility/2006">
               <mc:Choice xmlns:v="urn:schemas-microsoft-com:vml" Requires="v">
-                <p:oleObj spid="_x0000_s198328" name="Equation" r:id="rId9" imgW="508000" imgH="431800" progId="">
+                <p:oleObj spid="_x0000_s198388" name="Equation" r:id="rId9" imgW="508000" imgH="431800" progId="">
                   <p:embed/>
                 </p:oleObj>
               </mc:Choice>
@@ -29348,7 +29906,7 @@
           <a:graphicData uri="http://schemas.openxmlformats.org/presentationml/2006/ole">
             <mc:AlternateContent xmlns:mc="http://schemas.openxmlformats.org/markup-compatibility/2006">
               <mc:Choice xmlns:v="urn:schemas-microsoft-com:vml" Requires="v">
-                <p:oleObj spid="_x0000_s198329" name="Equation" r:id="rId11" imgW="977476" imgH="444307" progId="">
+                <p:oleObj spid="_x0000_s198389" name="Equation" r:id="rId11" imgW="977476" imgH="444307" progId="">
                   <p:embed/>
                 </p:oleObj>
               </mc:Choice>
@@ -29424,7 +29982,7 @@
           <a:graphicData uri="http://schemas.openxmlformats.org/presentationml/2006/ole">
             <mc:AlternateContent xmlns:mc="http://schemas.openxmlformats.org/markup-compatibility/2006">
               <mc:Choice xmlns:v="urn:schemas-microsoft-com:vml" Requires="v">
-                <p:oleObj spid="_x0000_s198330" name="公式" r:id="rId13" imgW="1371600" imgH="241300" progId="Equation.3">
+                <p:oleObj spid="_x0000_s198390" name="公式" r:id="rId13" imgW="1371600" imgH="241300" progId="Equation.3">
                   <p:embed/>
                 </p:oleObj>
               </mc:Choice>
@@ -29650,7 +30208,7 @@
           <a:graphicData uri="http://schemas.openxmlformats.org/presentationml/2006/ole">
             <mc:AlternateContent xmlns:mc="http://schemas.openxmlformats.org/markup-compatibility/2006">
               <mc:Choice xmlns:v="urn:schemas-microsoft-com:vml" Requires="v">
-                <p:oleObj spid="_x0000_s199233" name="Equation" r:id="rId3" imgW="3213100" imgH="444500" progId="">
+                <p:oleObj spid="_x0000_s199283" name="Equation" r:id="rId3" imgW="3213100" imgH="444500" progId="">
                   <p:embed/>
                 </p:oleObj>
               </mc:Choice>
@@ -29720,7 +30278,7 @@
           <a:graphicData uri="http://schemas.openxmlformats.org/presentationml/2006/ole">
             <mc:AlternateContent xmlns:mc="http://schemas.openxmlformats.org/markup-compatibility/2006">
               <mc:Choice xmlns:v="urn:schemas-microsoft-com:vml" Requires="v">
-                <p:oleObj spid="_x0000_s199234" name="Equation" r:id="rId5" imgW="3340100" imgH="1358900" progId="">
+                <p:oleObj spid="_x0000_s199284" name="Equation" r:id="rId5" imgW="3340100" imgH="1358900" progId="">
                   <p:embed/>
                 </p:oleObj>
               </mc:Choice>
@@ -29790,7 +30348,7 @@
           <a:graphicData uri="http://schemas.openxmlformats.org/presentationml/2006/ole">
             <mc:AlternateContent xmlns:mc="http://schemas.openxmlformats.org/markup-compatibility/2006">
               <mc:Choice xmlns:v="urn:schemas-microsoft-com:vml" Requires="v">
-                <p:oleObj spid="_x0000_s199235" name="Equation" r:id="rId7" imgW="2057400" imgH="228600" progId="">
+                <p:oleObj spid="_x0000_s199285" name="Equation" r:id="rId7" imgW="2057400" imgH="228600" progId="">
                   <p:embed/>
                 </p:oleObj>
               </mc:Choice>
@@ -29866,7 +30424,7 @@
           <a:graphicData uri="http://schemas.openxmlformats.org/presentationml/2006/ole">
             <mc:AlternateContent xmlns:mc="http://schemas.openxmlformats.org/markup-compatibility/2006">
               <mc:Choice xmlns:v="urn:schemas-microsoft-com:vml" Requires="v">
-                <p:oleObj spid="_x0000_s199236" name="Equation" r:id="rId9" imgW="380835" imgH="203112" progId="">
+                <p:oleObj spid="_x0000_s199286" name="Equation" r:id="rId9" imgW="380835" imgH="203112" progId="">
                   <p:embed/>
                 </p:oleObj>
               </mc:Choice>
@@ -29942,7 +30500,7 @@
           <a:graphicData uri="http://schemas.openxmlformats.org/presentationml/2006/ole">
             <mc:AlternateContent xmlns:mc="http://schemas.openxmlformats.org/markup-compatibility/2006">
               <mc:Choice xmlns:v="urn:schemas-microsoft-com:vml" Requires="v">
-                <p:oleObj spid="_x0000_s199237" name="Equation" r:id="rId11" imgW="444307" imgH="228501" progId="">
+                <p:oleObj spid="_x0000_s199287" name="Equation" r:id="rId11" imgW="444307" imgH="228501" progId="">
                   <p:embed/>
                 </p:oleObj>
               </mc:Choice>
@@ -31557,7 +32115,7 @@
           <a:graphicData uri="http://schemas.openxmlformats.org/presentationml/2006/ole">
             <mc:AlternateContent xmlns:mc="http://schemas.openxmlformats.org/markup-compatibility/2006">
               <mc:Choice xmlns:v="urn:schemas-microsoft-com:vml" Requires="v">
-                <p:oleObj spid="_x0000_s209013" name="Equation" r:id="rId3" imgW="4749800" imgH="1270000" progId="Equation.3">
+                <p:oleObj spid="_x0000_s209023" name="Equation" r:id="rId3" imgW="4749800" imgH="1270000" progId="Equation.3">
                   <p:embed/>
                 </p:oleObj>
               </mc:Choice>
@@ -32034,7 +32592,7 @@
           <a:graphicData uri="http://schemas.openxmlformats.org/presentationml/2006/ole">
             <mc:AlternateContent xmlns:mc="http://schemas.openxmlformats.org/markup-compatibility/2006">
               <mc:Choice xmlns:v="urn:schemas-microsoft-com:vml" Requires="v">
-                <p:oleObj spid="_x0000_s200821" name="Equation" r:id="rId3" imgW="3022600" imgH="1600200" progId="">
+                <p:oleObj spid="_x0000_s200831" name="Equation" r:id="rId3" imgW="3022600" imgH="1600200" progId="">
                   <p:embed/>
                 </p:oleObj>
               </mc:Choice>
@@ -32232,7 +32790,7 @@
           <a:graphicData uri="http://schemas.openxmlformats.org/presentationml/2006/ole">
             <mc:AlternateContent xmlns:mc="http://schemas.openxmlformats.org/markup-compatibility/2006">
               <mc:Choice xmlns:v="urn:schemas-microsoft-com:vml" Requires="v">
-                <p:oleObj spid="_x0000_s205942" name="Equation" r:id="rId5" imgW="2235200" imgH="482600" progId="">
+                <p:oleObj spid="_x0000_s205952" name="Equation" r:id="rId5" imgW="2235200" imgH="482600" progId="">
                   <p:embed/>
                 </p:oleObj>
               </mc:Choice>
@@ -32655,7 +33213,7 @@
           <a:graphicData uri="http://schemas.openxmlformats.org/presentationml/2006/ole">
             <mc:AlternateContent xmlns:mc="http://schemas.openxmlformats.org/markup-compatibility/2006">
               <mc:Choice xmlns:v="urn:schemas-microsoft-com:vml" Requires="v">
-                <p:oleObj spid="_x0000_s199912" name="Equation" r:id="rId3" imgW="4419600" imgH="2463800" progId="">
+                <p:oleObj spid="_x0000_s199932" name="Equation" r:id="rId3" imgW="4419600" imgH="2463800" progId="">
                   <p:embed/>
                 </p:oleObj>
               </mc:Choice>
@@ -32731,7 +33289,7 @@
           <a:graphicData uri="http://schemas.openxmlformats.org/presentationml/2006/ole">
             <mc:AlternateContent xmlns:mc="http://schemas.openxmlformats.org/markup-compatibility/2006">
               <mc:Choice xmlns:v="urn:schemas-microsoft-com:vml" Requires="v">
-                <p:oleObj spid="_x0000_s199913" name="Equation" r:id="rId5" imgW="2006600" imgH="431800" progId="">
+                <p:oleObj spid="_x0000_s199933" name="Equation" r:id="rId5" imgW="2006600" imgH="431800" progId="">
                   <p:embed/>
                 </p:oleObj>
               </mc:Choice>
@@ -35423,12 +35981,12 @@
           <a:graphicData uri="http://schemas.openxmlformats.org/presentationml/2006/ole">
             <mc:AlternateContent xmlns:mc="http://schemas.openxmlformats.org/markup-compatibility/2006">
               <mc:Choice xmlns:v="urn:schemas-microsoft-com:vml" Requires="v">
-                <p:oleObj spid="_x0000_s166235" name="Equation" r:id="rId3" imgW="1612900" imgH="431800" progId="">
+                <p:oleObj spid="_x0000_s166265" name="Equation" r:id="rId4" imgW="1612900" imgH="431800" progId="">
                   <p:embed/>
                 </p:oleObj>
               </mc:Choice>
               <mc:Fallback>
-                <p:oleObj name="Equation" r:id="rId3" imgW="1612900" imgH="431800" progId="">
+                <p:oleObj name="Equation" r:id="rId4" imgW="1612900" imgH="431800" progId="">
                   <p:embed/>
                   <p:pic>
                     <p:nvPicPr>
@@ -35439,7 +35997,7 @@
                       <p:nvPr/>
                     </p:nvPicPr>
                     <p:blipFill>
-                      <a:blip r:embed="rId4">
+                      <a:blip r:embed="rId5">
                         <a:extLst>
                           <a:ext uri="{28A0092B-C50C-407E-A947-70E740481C1C}">
                             <a14:useLocalDpi xmlns:a14="http://schemas.microsoft.com/office/drawing/2010/main" val="0"/>
@@ -35567,12 +36125,12 @@
           <a:graphicData uri="http://schemas.openxmlformats.org/presentationml/2006/ole">
             <mc:AlternateContent xmlns:mc="http://schemas.openxmlformats.org/markup-compatibility/2006">
               <mc:Choice xmlns:v="urn:schemas-microsoft-com:vml" Requires="v">
-                <p:oleObj spid="_x0000_s166236" name="Equation" r:id="rId5" imgW="888614" imgH="634725" progId="">
+                <p:oleObj spid="_x0000_s166266" name="Equation" r:id="rId6" imgW="888614" imgH="634725" progId="">
                   <p:embed/>
                 </p:oleObj>
               </mc:Choice>
               <mc:Fallback>
-                <p:oleObj name="Equation" r:id="rId5" imgW="888614" imgH="634725" progId="">
+                <p:oleObj name="Equation" r:id="rId6" imgW="888614" imgH="634725" progId="">
                   <p:embed/>
                   <p:pic>
                     <p:nvPicPr>
@@ -35583,7 +36141,7 @@
                       <p:nvPr/>
                     </p:nvPicPr>
                     <p:blipFill>
-                      <a:blip r:embed="rId6">
+                      <a:blip r:embed="rId7">
                         <a:extLst>
                           <a:ext uri="{28A0092B-C50C-407E-A947-70E740481C1C}">
                             <a14:useLocalDpi xmlns:a14="http://schemas.microsoft.com/office/drawing/2010/main" val="0"/>
@@ -35637,12 +36195,12 @@
           <a:graphicData uri="http://schemas.openxmlformats.org/presentationml/2006/ole">
             <mc:AlternateContent xmlns:mc="http://schemas.openxmlformats.org/markup-compatibility/2006">
               <mc:Choice xmlns:v="urn:schemas-microsoft-com:vml" Requires="v">
-                <p:oleObj spid="_x0000_s166237" name="Equation" r:id="rId7" imgW="1231900" imgH="457200" progId="">
+                <p:oleObj spid="_x0000_s166267" name="Equation" r:id="rId8" imgW="1231900" imgH="457200" progId="">
                   <p:embed/>
                 </p:oleObj>
               </mc:Choice>
               <mc:Fallback>
-                <p:oleObj name="Equation" r:id="rId7" imgW="1231900" imgH="457200" progId="">
+                <p:oleObj name="Equation" r:id="rId8" imgW="1231900" imgH="457200" progId="">
                   <p:embed/>
                   <p:pic>
                     <p:nvPicPr>
@@ -35653,7 +36211,7 @@
                       <p:nvPr/>
                     </p:nvPicPr>
                     <p:blipFill>
-                      <a:blip r:embed="rId8">
+                      <a:blip r:embed="rId9">
                         <a:extLst>
                           <a:ext uri="{28A0092B-C50C-407E-A947-70E740481C1C}">
                             <a14:useLocalDpi xmlns:a14="http://schemas.microsoft.com/office/drawing/2010/main" val="0"/>
@@ -39841,12 +40399,12 @@
           <a:graphicData uri="http://schemas.openxmlformats.org/presentationml/2006/ole">
             <mc:AlternateContent xmlns:mc="http://schemas.openxmlformats.org/markup-compatibility/2006">
               <mc:Choice xmlns:v="urn:schemas-microsoft-com:vml" Requires="v">
-                <p:oleObj spid="_x0000_s211007" name="公式" r:id="rId3" imgW="4000500" imgH="533400" progId="Equation.3">
+                <p:oleObj spid="_x0000_s211017" name="公式" r:id="rId4" imgW="4000500" imgH="533400" progId="Equation.3">
                   <p:embed/>
                 </p:oleObj>
               </mc:Choice>
               <mc:Fallback>
-                <p:oleObj name="公式" r:id="rId3" imgW="4000500" imgH="533400" progId="Equation.3">
+                <p:oleObj name="公式" r:id="rId4" imgW="4000500" imgH="533400" progId="Equation.3">
                   <p:embed/>
                   <p:pic>
                     <p:nvPicPr>
@@ -39857,7 +40415,7 @@
                       <p:nvPr/>
                     </p:nvPicPr>
                     <p:blipFill>
-                      <a:blip r:embed="rId4">
+                      <a:blip r:embed="rId5">
                         <a:extLst>
                           <a:ext uri="{28A0092B-C50C-407E-A947-70E740481C1C}">
                             <a14:useLocalDpi xmlns:a14="http://schemas.microsoft.com/office/drawing/2010/main" val="0"/>
@@ -41661,7 +42219,7 @@
           <a:graphicData uri="http://schemas.openxmlformats.org/presentationml/2006/ole">
             <mc:AlternateContent xmlns:mc="http://schemas.openxmlformats.org/markup-compatibility/2006">
               <mc:Choice xmlns:v="urn:schemas-microsoft-com:vml" Requires="v">
-                <p:oleObj spid="_x0000_s167374" name="Equation" r:id="rId3" imgW="939392" imgH="203112" progId="">
+                <p:oleObj spid="_x0000_s167414" name="Equation" r:id="rId3" imgW="939392" imgH="203112" progId="">
                   <p:embed/>
                 </p:oleObj>
               </mc:Choice>
@@ -41731,7 +42289,7 @@
           <a:graphicData uri="http://schemas.openxmlformats.org/presentationml/2006/ole">
             <mc:AlternateContent xmlns:mc="http://schemas.openxmlformats.org/markup-compatibility/2006">
               <mc:Choice xmlns:v="urn:schemas-microsoft-com:vml" Requires="v">
-                <p:oleObj spid="_x0000_s167375" name="Equation" r:id="rId5" imgW="1409088" imgH="863225" progId="">
+                <p:oleObj spid="_x0000_s167415" name="Equation" r:id="rId5" imgW="1409088" imgH="863225" progId="">
                   <p:embed/>
                 </p:oleObj>
               </mc:Choice>
@@ -41801,7 +42359,7 @@
           <a:graphicData uri="http://schemas.openxmlformats.org/presentationml/2006/ole">
             <mc:AlternateContent xmlns:mc="http://schemas.openxmlformats.org/markup-compatibility/2006">
               <mc:Choice xmlns:v="urn:schemas-microsoft-com:vml" Requires="v">
-                <p:oleObj spid="_x0000_s167376" name="Equation" r:id="rId7" imgW="1726451" imgH="634725" progId="">
+                <p:oleObj spid="_x0000_s167416" name="Equation" r:id="rId7" imgW="1726451" imgH="634725" progId="">
                   <p:embed/>
                 </p:oleObj>
               </mc:Choice>
@@ -41908,7 +42466,7 @@
           <a:graphicData uri="http://schemas.openxmlformats.org/presentationml/2006/ole">
             <mc:AlternateContent xmlns:mc="http://schemas.openxmlformats.org/markup-compatibility/2006">
               <mc:Choice xmlns:v="urn:schemas-microsoft-com:vml" Requires="v">
-                <p:oleObj spid="_x0000_s167377" name="Equation" r:id="rId9" imgW="342751" imgH="418918" progId="">
+                <p:oleObj spid="_x0000_s167417" name="Equation" r:id="rId9" imgW="342751" imgH="418918" progId="">
                   <p:embed/>
                 </p:oleObj>
               </mc:Choice>
@@ -49424,12 +49982,12 @@
           <a:graphicData uri="http://schemas.openxmlformats.org/presentationml/2006/ole">
             <mc:AlternateContent xmlns:mc="http://schemas.openxmlformats.org/markup-compatibility/2006">
               <mc:Choice xmlns:v="urn:schemas-microsoft-com:vml" Requires="v">
-                <p:oleObj spid="_x0000_s169078" name="Equation" r:id="rId3" imgW="647700" imgH="419100" progId="">
+                <p:oleObj spid="_x0000_s169089" name="Equation" r:id="rId4" imgW="647700" imgH="419100" progId="">
                   <p:embed/>
                 </p:oleObj>
               </mc:Choice>
               <mc:Fallback>
-                <p:oleObj name="Equation" r:id="rId3" imgW="647700" imgH="419100" progId="">
+                <p:oleObj name="Equation" r:id="rId4" imgW="647700" imgH="419100" progId="">
                   <p:embed/>
                   <p:pic>
                     <p:nvPicPr>
@@ -49440,7 +49998,7 @@
                       <p:nvPr/>
                     </p:nvPicPr>
                     <p:blipFill>
-                      <a:blip r:embed="rId4">
+                      <a:blip r:embed="rId5">
                         <a:extLst>
                           <a:ext uri="{28A0092B-C50C-407E-A947-70E740481C1C}">
                             <a14:useLocalDpi xmlns:a14="http://schemas.microsoft.com/office/drawing/2010/main" val="0"/>
@@ -49495,7 +50053,7 @@
           <p:nvPr/>
         </p:nvPicPr>
         <p:blipFill>
-          <a:blip r:embed="rId5" cstate="print">
+          <a:blip r:embed="rId6" cstate="print">
             <a:extLst>
               <a:ext uri="{28A0092B-C50C-407E-A947-70E740481C1C}">
                 <a14:useLocalDpi xmlns:a14="http://schemas.microsoft.com/office/drawing/2010/main" val="0"/>

</xml_diff>